<commit_message>
Chap05: Lucien corrections finished, need proofread
</commit_message>
<xml_diff>
--- a/05-CrDyn/Pictures/TauhCr.pptx
+++ b/05-CrDyn/Pictures/TauhCr.pptx
@@ -288,7 +288,7 @@
           <a:p>
             <a:fld id="{ED2E2F2B-DA5F-40A5-AA8B-1CC432AA17FD}" type="datetimeFigureOut">
               <a:rPr lang="fr-FR" smtClean="0"/>
-              <a:t>24/10/2017</a:t>
+              <a:t>31/10/2017</a:t>
             </a:fld>
             <a:endParaRPr lang="fr-FR"/>
           </a:p>
@@ -458,7 +458,7 @@
           <a:p>
             <a:fld id="{ED2E2F2B-DA5F-40A5-AA8B-1CC432AA17FD}" type="datetimeFigureOut">
               <a:rPr lang="fr-FR" smtClean="0"/>
-              <a:t>24/10/2017</a:t>
+              <a:t>31/10/2017</a:t>
             </a:fld>
             <a:endParaRPr lang="fr-FR"/>
           </a:p>
@@ -638,7 +638,7 @@
           <a:p>
             <a:fld id="{ED2E2F2B-DA5F-40A5-AA8B-1CC432AA17FD}" type="datetimeFigureOut">
               <a:rPr lang="fr-FR" smtClean="0"/>
-              <a:t>24/10/2017</a:t>
+              <a:t>31/10/2017</a:t>
             </a:fld>
             <a:endParaRPr lang="fr-FR"/>
           </a:p>
@@ -808,7 +808,7 @@
           <a:p>
             <a:fld id="{ED2E2F2B-DA5F-40A5-AA8B-1CC432AA17FD}" type="datetimeFigureOut">
               <a:rPr lang="fr-FR" smtClean="0"/>
-              <a:t>24/10/2017</a:t>
+              <a:t>31/10/2017</a:t>
             </a:fld>
             <a:endParaRPr lang="fr-FR"/>
           </a:p>
@@ -1054,7 +1054,7 @@
           <a:p>
             <a:fld id="{ED2E2F2B-DA5F-40A5-AA8B-1CC432AA17FD}" type="datetimeFigureOut">
               <a:rPr lang="fr-FR" smtClean="0"/>
-              <a:t>24/10/2017</a:t>
+              <a:t>31/10/2017</a:t>
             </a:fld>
             <a:endParaRPr lang="fr-FR"/>
           </a:p>
@@ -1342,7 +1342,7 @@
           <a:p>
             <a:fld id="{ED2E2F2B-DA5F-40A5-AA8B-1CC432AA17FD}" type="datetimeFigureOut">
               <a:rPr lang="fr-FR" smtClean="0"/>
-              <a:t>24/10/2017</a:t>
+              <a:t>31/10/2017</a:t>
             </a:fld>
             <a:endParaRPr lang="fr-FR"/>
           </a:p>
@@ -1769,7 +1769,7 @@
           <a:p>
             <a:fld id="{ED2E2F2B-DA5F-40A5-AA8B-1CC432AA17FD}" type="datetimeFigureOut">
               <a:rPr lang="fr-FR" smtClean="0"/>
-              <a:t>24/10/2017</a:t>
+              <a:t>31/10/2017</a:t>
             </a:fld>
             <a:endParaRPr lang="fr-FR"/>
           </a:p>
@@ -1887,7 +1887,7 @@
           <a:p>
             <a:fld id="{ED2E2F2B-DA5F-40A5-AA8B-1CC432AA17FD}" type="datetimeFigureOut">
               <a:rPr lang="fr-FR" smtClean="0"/>
-              <a:t>24/10/2017</a:t>
+              <a:t>31/10/2017</a:t>
             </a:fld>
             <a:endParaRPr lang="fr-FR"/>
           </a:p>
@@ -1982,7 +1982,7 @@
           <a:p>
             <a:fld id="{ED2E2F2B-DA5F-40A5-AA8B-1CC432AA17FD}" type="datetimeFigureOut">
               <a:rPr lang="fr-FR" smtClean="0"/>
-              <a:t>24/10/2017</a:t>
+              <a:t>31/10/2017</a:t>
             </a:fld>
             <a:endParaRPr lang="fr-FR"/>
           </a:p>
@@ -2259,7 +2259,7 @@
           <a:p>
             <a:fld id="{ED2E2F2B-DA5F-40A5-AA8B-1CC432AA17FD}" type="datetimeFigureOut">
               <a:rPr lang="fr-FR" smtClean="0"/>
-              <a:t>24/10/2017</a:t>
+              <a:t>31/10/2017</a:t>
             </a:fld>
             <a:endParaRPr lang="fr-FR"/>
           </a:p>
@@ -2512,7 +2512,7 @@
           <a:p>
             <a:fld id="{ED2E2F2B-DA5F-40A5-AA8B-1CC432AA17FD}" type="datetimeFigureOut">
               <a:rPr lang="fr-FR" smtClean="0"/>
-              <a:t>24/10/2017</a:t>
+              <a:t>31/10/2017</a:t>
             </a:fld>
             <a:endParaRPr lang="fr-FR"/>
           </a:p>
@@ -2725,7 +2725,7 @@
           <a:p>
             <a:fld id="{ED2E2F2B-DA5F-40A5-AA8B-1CC432AA17FD}" type="datetimeFigureOut">
               <a:rPr lang="fr-FR" smtClean="0"/>
-              <a:t>24/10/2017</a:t>
+              <a:t>31/10/2017</a:t>
             </a:fld>
             <a:endParaRPr lang="fr-FR"/>
           </a:p>
@@ -3163,25 +3163,25 @@
           <p:nvPr>
             <p:extLst>
               <p:ext uri="{D42A27DB-BD31-4B8C-83A1-F6EECF244321}">
-                <p14:modId xmlns:p14="http://schemas.microsoft.com/office/powerpoint/2010/main" val="341314744"/>
+                <p14:modId xmlns:p14="http://schemas.microsoft.com/office/powerpoint/2010/main" val="479785494"/>
               </p:ext>
             </p:extLst>
           </p:nvPr>
         </p:nvGraphicFramePr>
         <p:xfrm>
-          <a:off x="989621" y="558056"/>
-          <a:ext cx="1943100" cy="419100"/>
+          <a:off x="899840" y="630064"/>
+          <a:ext cx="857250" cy="419100"/>
         </p:xfrm>
         <a:graphic>
           <a:graphicData uri="http://schemas.openxmlformats.org/presentationml/2006/ole">
             <mc:AlternateContent xmlns:mc="http://schemas.openxmlformats.org/markup-compatibility/2006">
               <mc:Choice xmlns:v="urn:schemas-microsoft-com:vml" Requires="v">
-                <p:oleObj spid="_x0000_s1030" name="Équation" r:id="rId4" imgW="1295280" imgH="279360" progId="Equation.3">
+                <p:oleObj spid="_x0000_s1036" name="Équation" r:id="rId4" imgW="571320" imgH="279360" progId="Equation.3">
                   <p:embed/>
                 </p:oleObj>
               </mc:Choice>
               <mc:Fallback>
-                <p:oleObj name="Équation" r:id="rId4" imgW="1295280" imgH="279360" progId="Equation.3">
+                <p:oleObj name="Équation" r:id="rId4" imgW="571320" imgH="279360" progId="Equation.3">
                   <p:embed/>
                   <p:pic>
                     <p:nvPicPr>
@@ -3200,8 +3200,8 @@
                     </p:blipFill>
                     <p:spPr bwMode="auto">
                       <a:xfrm>
-                        <a:off x="989621" y="558056"/>
-                        <a:ext cx="1943100" cy="419100"/>
+                        <a:off x="899840" y="630064"/>
+                        <a:ext cx="857250" cy="419100"/>
                       </a:xfrm>
                       <a:prstGeom prst="rect">
                         <a:avLst/>
@@ -3256,25 +3256,25 @@
           <p:nvPr>
             <p:extLst>
               <p:ext uri="{D42A27DB-BD31-4B8C-83A1-F6EECF244321}">
-                <p14:modId xmlns:p14="http://schemas.microsoft.com/office/powerpoint/2010/main" val="1422184119"/>
+                <p14:modId xmlns:p14="http://schemas.microsoft.com/office/powerpoint/2010/main" val="2091471659"/>
               </p:ext>
             </p:extLst>
           </p:nvPr>
         </p:nvGraphicFramePr>
         <p:xfrm>
-          <a:off x="1113446" y="1710184"/>
-          <a:ext cx="1695450" cy="419100"/>
+          <a:off x="1040036" y="1709738"/>
+          <a:ext cx="723900" cy="419100"/>
         </p:xfrm>
         <a:graphic>
           <a:graphicData uri="http://schemas.openxmlformats.org/presentationml/2006/ole">
             <mc:AlternateContent xmlns:mc="http://schemas.openxmlformats.org/markup-compatibility/2006">
               <mc:Choice xmlns:v="urn:schemas-microsoft-com:vml" Requires="v">
-                <p:oleObj spid="_x0000_s1031" name="Équation" r:id="rId6" imgW="1130040" imgH="279360" progId="Equation.3">
+                <p:oleObj spid="_x0000_s1037" name="Équation" r:id="rId6" imgW="482400" imgH="279360" progId="Equation.3">
                   <p:embed/>
                 </p:oleObj>
               </mc:Choice>
               <mc:Fallback>
-                <p:oleObj name="Équation" r:id="rId6" imgW="1130040" imgH="279360" progId="Equation.3">
+                <p:oleObj name="Équation" r:id="rId6" imgW="482400" imgH="279360" progId="Equation.3">
                   <p:embed/>
                   <p:pic>
                     <p:nvPicPr>
@@ -3293,8 +3293,8 @@
                     </p:blipFill>
                     <p:spPr bwMode="auto">
                       <a:xfrm>
-                        <a:off x="1113446" y="1710184"/>
-                        <a:ext cx="1695450" cy="419100"/>
+                        <a:off x="1040036" y="1709738"/>
+                        <a:ext cx="723900" cy="419100"/>
                       </a:xfrm>
                       <a:prstGeom prst="rect">
                         <a:avLst/>
@@ -3350,7 +3350,308 @@
         </p:nvSpPr>
         <p:spPr bwMode="auto">
           <a:xfrm rot="5400000">
-            <a:off x="1718792" y="1212851"/>
+            <a:off x="1080466" y="1212851"/>
+            <a:ext cx="484757" cy="125929"/>
+          </a:xfrm>
+          <a:custGeom>
+            <a:avLst/>
+            <a:gdLst>
+              <a:gd name="G0" fmla="*/ 0 1604 1"/>
+              <a:gd name="G1" fmla="*/ G0 1 62639"/>
+              <a:gd name="G2" fmla="*/ 17013 454 1"/>
+              <a:gd name="G3" fmla="*/ G2 1 27677"/>
+              <a:gd name="G4" fmla="*/ 42863 1604 1"/>
+              <a:gd name="G5" fmla="*/ G4 1 62639"/>
+              <a:gd name="G6" fmla="*/ 11112 454 1"/>
+              <a:gd name="G7" fmla="*/ G6 1 27677"/>
+              <a:gd name="G8" fmla="*/ 48764 1604 1"/>
+              <a:gd name="G9" fmla="*/ G8 1 62639"/>
+              <a:gd name="G10" fmla="*/ 18152 454 1"/>
+              <a:gd name="G11" fmla="*/ G10 1 27677"/>
+              <a:gd name="G12" fmla="*/ 54666 1604 1"/>
+              <a:gd name="G13" fmla="*/ G12 1 62639"/>
+              <a:gd name="G14" fmla="*/ 20637 454 1"/>
+              <a:gd name="G15" fmla="*/ G14 1 27677"/>
+              <a:gd name="G16" fmla="*/ 60567 1604 1"/>
+              <a:gd name="G17" fmla="*/ G16 1 62639"/>
+              <a:gd name="G18" fmla="*/ 22915 454 1"/>
+              <a:gd name="G19" fmla="*/ G18 1 27677"/>
+              <a:gd name="G20" fmla="*/ 933 1604 1"/>
+              <a:gd name="G21" fmla="*/ G20 1 62639"/>
+              <a:gd name="G22" fmla="*/ 20637 454 1"/>
+              <a:gd name="G23" fmla="*/ G22 1 27677"/>
+              <a:gd name="G24" fmla="*/ 11597 1604 1"/>
+              <a:gd name="G25" fmla="*/ G24 1 62639"/>
+              <a:gd name="G26" fmla="*/ 27677 454 1"/>
+              <a:gd name="G27" fmla="*/ G26 1 27677"/>
+              <a:gd name="G28" fmla="*/ 17498 1604 1"/>
+              <a:gd name="G29" fmla="*/ G28 1 62639"/>
+              <a:gd name="G30" fmla="*/ 20637 454 1"/>
+              <a:gd name="G31" fmla="*/ G30 1 27677"/>
+              <a:gd name="G32" fmla="*/ 9112 1604 1"/>
+              <a:gd name="G33" fmla="*/ G32 1 62639"/>
+              <a:gd name="G34" fmla="*/ 21776 454 1"/>
+              <a:gd name="G35" fmla="*/ G34 1 27677"/>
+              <a:gd name="G36" fmla="*/ 42450 1604 1"/>
+              <a:gd name="G37" fmla="*/ G36 1 62639"/>
+              <a:gd name="G38" fmla="*/ 21776 454 1"/>
+              <a:gd name="G39" fmla="*/ G38 1 27677"/>
+              <a:gd name="G40" fmla="*/ 10251 1604 1"/>
+              <a:gd name="G41" fmla="*/ G40 1 62639"/>
+              <a:gd name="G42" fmla="*/ 21776 454 1"/>
+              <a:gd name="G43" fmla="*/ G42 1 27677"/>
+              <a:gd name="G44" fmla="*/ 62639 1604 1"/>
+              <a:gd name="G45" fmla="*/ G44 1 62639"/>
+              <a:gd name="G46" fmla="*/ 21776 454 1"/>
+              <a:gd name="G47" fmla="*/ G46 1 27677"/>
+              <a:gd name="G48" fmla="*/ 62639 1604 1"/>
+              <a:gd name="G49" fmla="*/ G48 1 62639"/>
+              <a:gd name="G50" fmla="*/ 21776 454 1"/>
+              <a:gd name="G51" fmla="*/ G50 1 27677"/>
+              <a:gd name="G52" fmla="*/ 62639 1604 1"/>
+              <a:gd name="G53" fmla="*/ G52 1 62639"/>
+              <a:gd name="G54" fmla="*/ 21776 454 1"/>
+              <a:gd name="G55" fmla="*/ G54 1 27677"/>
+              <a:gd name="G56" fmla="+- 1604 0 0"/>
+              <a:gd name="G57" fmla="+- 454 0 0"/>
+            </a:gdLst>
+            <a:ahLst/>
+            <a:cxnLst>
+              <a:cxn ang="0">
+                <a:pos x="r" y="vc"/>
+              </a:cxn>
+              <a:cxn ang="5400000">
+                <a:pos x="hc" y="b"/>
+              </a:cxn>
+              <a:cxn ang="10800000">
+                <a:pos x="l" y="vc"/>
+              </a:cxn>
+              <a:cxn ang="16200000">
+                <a:pos x="hc" y="t"/>
+              </a:cxn>
+            </a:cxnLst>
+            <a:rect l="0" t="0" r="0" b="0"/>
+            <a:pathLst>
+              <a:path>
+                <a:moveTo>
+                  <a:pt x="0" y="82549"/>
+                </a:moveTo>
+                <a:cubicBezTo>
+                  <a:pt x="11906" y="41274"/>
+                  <a:pt x="23813" y="0"/>
+                  <a:pt x="42863" y="11112"/>
+                </a:cubicBezTo>
+                <a:cubicBezTo>
+                  <a:pt x="61913" y="22224"/>
+                  <a:pt x="90487" y="147636"/>
+                  <a:pt x="114300" y="149224"/>
+                </a:cubicBezTo>
+                <a:cubicBezTo>
+                  <a:pt x="138113" y="150812"/>
+                  <a:pt x="161926" y="19843"/>
+                  <a:pt x="185738" y="20637"/>
+                </a:cubicBezTo>
+                <a:cubicBezTo>
+                  <a:pt x="209550" y="21431"/>
+                  <a:pt x="233363" y="153987"/>
+                  <a:pt x="257175" y="153987"/>
+                </a:cubicBezTo>
+                <a:cubicBezTo>
+                  <a:pt x="280987" y="153987"/>
+                  <a:pt x="304007" y="19843"/>
+                  <a:pt x="328613" y="20637"/>
+                </a:cubicBezTo>
+                <a:cubicBezTo>
+                  <a:pt x="353219" y="21431"/>
+                  <a:pt x="380207" y="158749"/>
+                  <a:pt x="404813" y="158749"/>
+                </a:cubicBezTo>
+                <a:cubicBezTo>
+                  <a:pt x="429419" y="158749"/>
+                  <a:pt x="454819" y="32543"/>
+                  <a:pt x="476250" y="20637"/>
+                </a:cubicBezTo>
+                <a:cubicBezTo>
+                  <a:pt x="497681" y="8731"/>
+                  <a:pt x="518319" y="76199"/>
+                  <a:pt x="533400" y="87312"/>
+                </a:cubicBezTo>
+                <a:cubicBezTo>
+                  <a:pt x="548481" y="98425"/>
+                  <a:pt x="566738" y="87312"/>
+                  <a:pt x="566738" y="87312"/>
+                </a:cubicBezTo>
+                <a:lnTo>
+                  <a:pt x="600075" y="87312"/>
+                </a:lnTo>
+                <a:lnTo>
+                  <a:pt x="652463" y="87312"/>
+                </a:lnTo>
+              </a:path>
+            </a:pathLst>
+          </a:custGeom>
+          <a:noFill/>
+          <a:ln w="9360" cap="flat">
+            <a:solidFill>
+              <a:srgbClr val="00B050"/>
+            </a:solidFill>
+            <a:round/>
+            <a:headEnd/>
+            <a:tailEnd type="stealth" w="med" len="med"/>
+          </a:ln>
+          <a:effectLst/>
+          <a:extLst>
+            <a:ext uri="{909E8E84-426E-40DD-AFC4-6F175D3DCCD1}">
+              <a14:hiddenFill xmlns:a14="http://schemas.microsoft.com/office/drawing/2010/main">
+                <a:solidFill>
+                  <a:srgbClr val="FFFFFF"/>
+                </a:solidFill>
+              </a14:hiddenFill>
+            </a:ext>
+            <a:ext uri="{AF507438-7753-43E0-B8FC-AC1667EBCBE1}">
+              <a14:hiddenEffects xmlns:a14="http://schemas.microsoft.com/office/drawing/2010/main">
+                <a:effectLst>
+                  <a:outerShdw dist="35921" dir="2700000" algn="ctr" rotWithShape="0">
+                    <a:srgbClr val="808080"/>
+                  </a:outerShdw>
+                </a:effectLst>
+              </a14:hiddenEffects>
+            </a:ext>
+          </a:extLst>
+        </p:spPr>
+        <p:txBody>
+          <a:bodyPr wrap="none" lIns="86895" tIns="43448" rIns="86895" bIns="43448" anchor="ctr"/>
+          <a:lstStyle/>
+          <a:p>
+            <a:endParaRPr lang="fr-FR"/>
+          </a:p>
+        </p:txBody>
+      </p:sp>
+      <p:graphicFrame>
+        <p:nvGraphicFramePr>
+          <p:cNvPr id="2" name="Objet 1"/>
+          <p:cNvGraphicFramePr>
+            <a:graphicFrameLocks noChangeAspect="1"/>
+          </p:cNvGraphicFramePr>
+          <p:nvPr>
+            <p:extLst>
+              <p:ext uri="{D42A27DB-BD31-4B8C-83A1-F6EECF244321}">
+                <p14:modId xmlns:p14="http://schemas.microsoft.com/office/powerpoint/2010/main" val="2345169980"/>
+              </p:ext>
+            </p:extLst>
+          </p:nvPr>
+        </p:nvGraphicFramePr>
+        <p:xfrm>
+          <a:off x="1907952" y="630064"/>
+          <a:ext cx="825081" cy="403373"/>
+        </p:xfrm>
+        <a:graphic>
+          <a:graphicData uri="http://schemas.openxmlformats.org/presentationml/2006/ole">
+            <mc:AlternateContent xmlns:mc="http://schemas.openxmlformats.org/markup-compatibility/2006">
+              <mc:Choice xmlns:v="urn:schemas-microsoft-com:vml" Requires="v">
+                <p:oleObj spid="_x0000_s1038" name="Équation" r:id="rId8" imgW="571320" imgH="279360" progId="Equation.3">
+                  <p:embed/>
+                </p:oleObj>
+              </mc:Choice>
+              <mc:Fallback>
+                <p:oleObj name="Équation" r:id="rId8" imgW="571320" imgH="279360" progId="Equation.3">
+                  <p:embed/>
+                  <p:pic>
+                    <p:nvPicPr>
+                      <p:cNvPr id="0" name=""/>
+                      <p:cNvPicPr/>
+                      <p:nvPr/>
+                    </p:nvPicPr>
+                    <p:blipFill>
+                      <a:blip r:embed="rId9"/>
+                      <a:stretch>
+                        <a:fillRect/>
+                      </a:stretch>
+                    </p:blipFill>
+                    <p:spPr>
+                      <a:xfrm>
+                        <a:off x="1907952" y="630064"/>
+                        <a:ext cx="825081" cy="403373"/>
+                      </a:xfrm>
+                      <a:prstGeom prst="rect">
+                        <a:avLst/>
+                      </a:prstGeom>
+                    </p:spPr>
+                  </p:pic>
+                </p:oleObj>
+              </mc:Fallback>
+            </mc:AlternateContent>
+          </a:graphicData>
+        </a:graphic>
+      </p:graphicFrame>
+      <p:graphicFrame>
+        <p:nvGraphicFramePr>
+          <p:cNvPr id="3" name="Objet 2"/>
+          <p:cNvGraphicFramePr>
+            <a:graphicFrameLocks noChangeAspect="1"/>
+          </p:cNvGraphicFramePr>
+          <p:nvPr>
+            <p:extLst>
+              <p:ext uri="{D42A27DB-BD31-4B8C-83A1-F6EECF244321}">
+                <p14:modId xmlns:p14="http://schemas.microsoft.com/office/powerpoint/2010/main" val="4129058343"/>
+              </p:ext>
+            </p:extLst>
+          </p:nvPr>
+        </p:nvGraphicFramePr>
+        <p:xfrm>
+          <a:off x="1993789" y="1703214"/>
+          <a:ext cx="778259" cy="439018"/>
+        </p:xfrm>
+        <a:graphic>
+          <a:graphicData uri="http://schemas.openxmlformats.org/presentationml/2006/ole">
+            <mc:AlternateContent xmlns:mc="http://schemas.openxmlformats.org/markup-compatibility/2006">
+              <mc:Choice xmlns:v="urn:schemas-microsoft-com:vml" Requires="v">
+                <p:oleObj spid="_x0000_s1039" name="Équation" r:id="rId10" imgW="495000" imgH="279360" progId="Equation.3">
+                  <p:embed/>
+                </p:oleObj>
+              </mc:Choice>
+              <mc:Fallback>
+                <p:oleObj name="Équation" r:id="rId10" imgW="495000" imgH="279360" progId="Equation.3">
+                  <p:embed/>
+                  <p:pic>
+                    <p:nvPicPr>
+                      <p:cNvPr id="0" name=""/>
+                      <p:cNvPicPr/>
+                      <p:nvPr/>
+                    </p:nvPicPr>
+                    <p:blipFill>
+                      <a:blip r:embed="rId11"/>
+                      <a:stretch>
+                        <a:fillRect/>
+                      </a:stretch>
+                    </p:blipFill>
+                    <p:spPr>
+                      <a:xfrm>
+                        <a:off x="1993789" y="1703214"/>
+                        <a:ext cx="778259" cy="439018"/>
+                      </a:xfrm>
+                      <a:prstGeom prst="rect">
+                        <a:avLst/>
+                      </a:prstGeom>
+                    </p:spPr>
+                  </p:pic>
+                </p:oleObj>
+              </mc:Fallback>
+            </mc:AlternateContent>
+          </a:graphicData>
+        </a:graphic>
+      </p:graphicFrame>
+      <p:sp>
+        <p:nvSpPr>
+          <p:cNvPr id="8" name="AutoShape 12"/>
+          <p:cNvSpPr>
+            <a:spLocks/>
+          </p:cNvSpPr>
+          <p:nvPr/>
+        </p:nvSpPr>
+        <p:spPr bwMode="auto">
+          <a:xfrm rot="5400000">
+            <a:off x="2034657" y="1212850"/>
             <a:ext cx="484757" cy="125929"/>
           </a:xfrm>
           <a:custGeom>

</xml_diff>